<commit_message>
recovered GVI WAM example
</commit_message>
<xml_diff>
--- a/matlab_helpers/GVIMP-examples/figures_slide.pptx
+++ b/matlab_helpers/GVIMP-examples/figures_slide.pptx
@@ -1414,7 +1414,19 @@
               <a:rPr b="0" lang="en-US" sz="4400" spc="-1" strike="noStrike">
                 <a:latin typeface="Arial"/>
               </a:rPr>
-              <a:t>Click to edit the title text format</a:t>
+              <a:t>Click to edit </a:t>
+            </a:r>
+            <a:r>
+              <a:rPr b="0" lang="en-US" sz="4400" spc="-1" strike="noStrike">
+                <a:latin typeface="Arial"/>
+              </a:rPr>
+              <a:t>the title text </a:t>
+            </a:r>
+            <a:r>
+              <a:rPr b="0" lang="en-US" sz="4400" spc="-1" strike="noStrike">
+                <a:latin typeface="Arial"/>
+              </a:rPr>
+              <a:t>format</a:t>
             </a:r>
             <a:endParaRPr b="0" lang="en-US" sz="4400" spc="-1" strike="noStrike">
               <a:latin typeface="Arial"/>
@@ -1699,7 +1711,7 @@
           </a:bodyPr>
           <a:p>
             <a:pPr algn="r"/>
-            <a:fld id="{933DA84F-C616-4CFB-972D-D5BEF854029A}" type="slidenum">
+            <a:fld id="{C3203DD2-B9CE-4CA1-890C-2B56848BB145}" type="slidenum">
               <a:rPr b="0" lang="en-US" sz="1400" spc="-1" strike="noStrike">
                 <a:latin typeface="Times New Roman"/>
               </a:rPr>
@@ -1760,8 +1772,8 @@
         </p:blipFill>
         <p:spPr>
           <a:xfrm>
-            <a:off x="15480" y="1172520"/>
-            <a:ext cx="10079640" cy="3330000"/>
+            <a:off x="15480" y="810360"/>
+            <a:ext cx="10079640" cy="4054320"/>
           </a:xfrm>
           <a:prstGeom prst="rect">
             <a:avLst/>
@@ -1771,250 +1783,6 @@
           </a:ln>
         </p:spPr>
       </p:pic>
-      <p:grpSp>
-        <p:nvGrpSpPr>
-          <p:cNvPr id="42" name="Group 1"/>
-          <p:cNvGrpSpPr/>
-          <p:nvPr/>
-        </p:nvGrpSpPr>
-        <p:grpSpPr>
-          <a:xfrm>
-            <a:off x="457200" y="2471760"/>
-            <a:ext cx="9326880" cy="602280"/>
-            <a:chOff x="457200" y="2471760"/>
-            <a:chExt cx="9326880" cy="602280"/>
-          </a:xfrm>
-        </p:grpSpPr>
-        <p:sp>
-          <p:nvSpPr>
-            <p:cNvPr id="43" name="CustomShape 2"/>
-            <p:cNvSpPr/>
-            <p:nvPr/>
-          </p:nvSpPr>
-          <p:spPr>
-            <a:xfrm>
-              <a:off x="457200" y="2765880"/>
-              <a:ext cx="9326880" cy="107640"/>
-            </a:xfrm>
-            <a:custGeom>
-              <a:avLst/>
-              <a:gdLst/>
-              <a:ahLst/>
-              <a:rect l="0" t="0" r="r" b="b"/>
-              <a:pathLst>
-                <a:path w="25910" h="301">
-                  <a:moveTo>
-                    <a:pt x="0" y="150"/>
-                  </a:moveTo>
-                  <a:lnTo>
-                    <a:pt x="545" y="0"/>
-                  </a:lnTo>
-                  <a:lnTo>
-                    <a:pt x="545" y="94"/>
-                  </a:lnTo>
-                  <a:lnTo>
-                    <a:pt x="25363" y="94"/>
-                  </a:lnTo>
-                  <a:lnTo>
-                    <a:pt x="25363" y="0"/>
-                  </a:lnTo>
-                  <a:lnTo>
-                    <a:pt x="25909" y="150"/>
-                  </a:lnTo>
-                  <a:lnTo>
-                    <a:pt x="25363" y="300"/>
-                  </a:lnTo>
-                  <a:lnTo>
-                    <a:pt x="25363" y="205"/>
-                  </a:lnTo>
-                  <a:lnTo>
-                    <a:pt x="545" y="205"/>
-                  </a:lnTo>
-                  <a:lnTo>
-                    <a:pt x="545" y="300"/>
-                  </a:lnTo>
-                  <a:lnTo>
-                    <a:pt x="0" y="150"/>
-                  </a:lnTo>
-                </a:path>
-              </a:pathLst>
-            </a:custGeom>
-            <a:solidFill>
-              <a:srgbClr val="2a6099"/>
-            </a:solidFill>
-            <a:ln>
-              <a:solidFill>
-                <a:srgbClr val="3465a4"/>
-              </a:solidFill>
-            </a:ln>
-          </p:spPr>
-          <p:style>
-            <a:lnRef idx="0"/>
-            <a:fillRef idx="0"/>
-            <a:effectRef idx="0"/>
-            <a:fontRef idx="minor"/>
-          </p:style>
-        </p:sp>
-        <p:sp>
-          <p:nvSpPr>
-            <p:cNvPr id="44" name="TextShape 3"/>
-            <p:cNvSpPr txBox="1"/>
-            <p:nvPr/>
-          </p:nvSpPr>
-          <p:spPr>
-            <a:xfrm>
-              <a:off x="2743200" y="2471760"/>
-              <a:ext cx="4297680" cy="602280"/>
-            </a:xfrm>
-            <a:prstGeom prst="rect">
-              <a:avLst/>
-            </a:prstGeom>
-            <a:noFill/>
-            <a:ln>
-              <a:noFill/>
-            </a:ln>
-          </p:spPr>
-          <p:txBody>
-            <a:bodyPr lIns="90000" rIns="90000" tIns="45000" bIns="45000">
-              <a:noAutofit/>
-            </a:bodyPr>
-            <a:p>
-              <a:pPr algn="ctr"/>
-              <a:r>
-                <a:rPr b="0" lang="en-US" sz="1800" spc="-1" strike="noStrike">
-                  <a:latin typeface="Arial"/>
-                </a:rPr>
-                <a:t>Low temperature collision avoidance</a:t>
-              </a:r>
-              <a:endParaRPr b="0" lang="en-US" sz="1800" spc="-1" strike="noStrike">
-                <a:latin typeface="Arial"/>
-              </a:endParaRPr>
-            </a:p>
-          </p:txBody>
-        </p:sp>
-      </p:grpSp>
-      <p:grpSp>
-        <p:nvGrpSpPr>
-          <p:cNvPr id="45" name="Group 4"/>
-          <p:cNvGrpSpPr/>
-          <p:nvPr/>
-        </p:nvGrpSpPr>
-        <p:grpSpPr>
-          <a:xfrm>
-            <a:off x="548640" y="4227480"/>
-            <a:ext cx="9326880" cy="602280"/>
-            <a:chOff x="548640" y="4227480"/>
-            <a:chExt cx="9326880" cy="602280"/>
-          </a:xfrm>
-        </p:grpSpPr>
-        <p:sp>
-          <p:nvSpPr>
-            <p:cNvPr id="46" name="CustomShape 5"/>
-            <p:cNvSpPr/>
-            <p:nvPr/>
-          </p:nvSpPr>
-          <p:spPr>
-            <a:xfrm>
-              <a:off x="548640" y="4503240"/>
-              <a:ext cx="9326880" cy="107640"/>
-            </a:xfrm>
-            <a:custGeom>
-              <a:avLst/>
-              <a:gdLst/>
-              <a:ahLst/>
-              <a:rect l="0" t="0" r="r" b="b"/>
-              <a:pathLst>
-                <a:path w="25910" h="301">
-                  <a:moveTo>
-                    <a:pt x="0" y="150"/>
-                  </a:moveTo>
-                  <a:lnTo>
-                    <a:pt x="545" y="0"/>
-                  </a:lnTo>
-                  <a:lnTo>
-                    <a:pt x="545" y="94"/>
-                  </a:lnTo>
-                  <a:lnTo>
-                    <a:pt x="25363" y="94"/>
-                  </a:lnTo>
-                  <a:lnTo>
-                    <a:pt x="25363" y="0"/>
-                  </a:lnTo>
-                  <a:lnTo>
-                    <a:pt x="25909" y="150"/>
-                  </a:lnTo>
-                  <a:lnTo>
-                    <a:pt x="25363" y="300"/>
-                  </a:lnTo>
-                  <a:lnTo>
-                    <a:pt x="25363" y="205"/>
-                  </a:lnTo>
-                  <a:lnTo>
-                    <a:pt x="545" y="205"/>
-                  </a:lnTo>
-                  <a:lnTo>
-                    <a:pt x="545" y="300"/>
-                  </a:lnTo>
-                  <a:lnTo>
-                    <a:pt x="0" y="150"/>
-                  </a:lnTo>
-                </a:path>
-              </a:pathLst>
-            </a:custGeom>
-            <a:solidFill>
-              <a:srgbClr val="2a6099"/>
-            </a:solidFill>
-            <a:ln>
-              <a:solidFill>
-                <a:srgbClr val="3465a4"/>
-              </a:solidFill>
-            </a:ln>
-          </p:spPr>
-          <p:style>
-            <a:lnRef idx="0"/>
-            <a:fillRef idx="0"/>
-            <a:effectRef idx="0"/>
-            <a:fontRef idx="minor"/>
-          </p:style>
-        </p:sp>
-        <p:sp>
-          <p:nvSpPr>
-            <p:cNvPr id="47" name="TextShape 6"/>
-            <p:cNvSpPr txBox="1"/>
-            <p:nvPr/>
-          </p:nvSpPr>
-          <p:spPr>
-            <a:xfrm>
-              <a:off x="3017520" y="4227480"/>
-              <a:ext cx="3749040" cy="602280"/>
-            </a:xfrm>
-            <a:prstGeom prst="rect">
-              <a:avLst/>
-            </a:prstGeom>
-            <a:noFill/>
-            <a:ln>
-              <a:noFill/>
-            </a:ln>
-          </p:spPr>
-          <p:txBody>
-            <a:bodyPr lIns="90000" rIns="90000" tIns="45000" bIns="45000">
-              <a:noAutofit/>
-            </a:bodyPr>
-            <a:p>
-              <a:pPr algn="ctr"/>
-              <a:r>
-                <a:rPr b="0" lang="en-US" sz="1800" spc="-1" strike="noStrike">
-                  <a:latin typeface="Arial"/>
-                </a:rPr>
-                <a:t>High temperature robustness</a:t>
-              </a:r>
-              <a:endParaRPr b="0" lang="en-US" sz="1800" spc="-1" strike="noStrike">
-                <a:latin typeface="Arial"/>
-              </a:endParaRPr>
-            </a:p>
-          </p:txBody>
-        </p:sp>
-      </p:grpSp>
     </p:spTree>
   </p:cSld>
   <mc:AlternateContent>

</xml_diff>